<commit_message>
added presentation slides PDF and leaderboard ID
</commit_message>
<xml_diff>
--- a/presentation-slides/Final Project Presentation.pptx
+++ b/presentation-slides/Final Project Presentation.pptx
@@ -33133,7 +33133,7 @@
           <a:noFill/>
           <a:extLst>
             <a:ext uri="{909E8E84-426E-40dd-AFC4-6F175D3DCCD1}">
-              <a14:hiddenFill xmlns="" xmlns:a14="http://schemas.microsoft.com/office/drawing/2010/main">
+              <a14:hiddenFill xmlns:a14="http://schemas.microsoft.com/office/drawing/2010/main" xmlns="">
                 <a:solidFill>
                   <a:srgbClr val="FFFFFF"/>
                 </a:solidFill>
@@ -33193,7 +33193,7 @@
             </a:ln>
             <a:extLst>
               <a:ext uri="{91240B29-F687-4f45-9708-019B960494DF}">
-                <a14:hiddenLine xmlns="" xmlns:a14="http://schemas.microsoft.com/office/drawing/2010/main" w="9525">
+                <a14:hiddenLine xmlns:a14="http://schemas.microsoft.com/office/drawing/2010/main" xmlns="" w="9525">
                   <a:solidFill>
                     <a:srgbClr val="000000"/>
                   </a:solidFill>
@@ -33283,7 +33283,7 @@
             </a:ln>
             <a:extLst>
               <a:ext uri="{91240B29-F687-4f45-9708-019B960494DF}">
-                <a14:hiddenLine xmlns="" xmlns:a14="http://schemas.microsoft.com/office/drawing/2010/main" w="9525">
+                <a14:hiddenLine xmlns:a14="http://schemas.microsoft.com/office/drawing/2010/main" xmlns="" w="9525">
                   <a:solidFill>
                     <a:srgbClr val="000000"/>
                   </a:solidFill>
@@ -33373,7 +33373,7 @@
             </a:ln>
             <a:extLst>
               <a:ext uri="{91240B29-F687-4f45-9708-019B960494DF}">
-                <a14:hiddenLine xmlns="" xmlns:a14="http://schemas.microsoft.com/office/drawing/2010/main" w="9525">
+                <a14:hiddenLine xmlns:a14="http://schemas.microsoft.com/office/drawing/2010/main" xmlns="" w="9525">
                   <a:solidFill>
                     <a:srgbClr val="000000"/>
                   </a:solidFill>
@@ -33407,7 +33407,7 @@
             </a:ln>
             <a:extLst>
               <a:ext uri="{91240B29-F687-4f45-9708-019B960494DF}">
-                <a14:hiddenLine xmlns="" xmlns:a14="http://schemas.microsoft.com/office/drawing/2010/main" w="9525">
+                <a14:hiddenLine xmlns:a14="http://schemas.microsoft.com/office/drawing/2010/main" xmlns="" w="9525">
                   <a:solidFill>
                     <a:srgbClr val="000000"/>
                   </a:solidFill>
@@ -33497,7 +33497,7 @@
             </a:ln>
             <a:extLst>
               <a:ext uri="{91240B29-F687-4f45-9708-019B960494DF}">
-                <a14:hiddenLine xmlns="" xmlns:a14="http://schemas.microsoft.com/office/drawing/2010/main" w="9525">
+                <a14:hiddenLine xmlns:a14="http://schemas.microsoft.com/office/drawing/2010/main" xmlns="" w="9525">
                   <a:solidFill>
                     <a:srgbClr val="000000"/>
                   </a:solidFill>
@@ -33559,7 +33559,7 @@
             </a:ln>
             <a:extLst>
               <a:ext uri="{91240B29-F687-4f45-9708-019B960494DF}">
-                <a14:hiddenLine xmlns="" xmlns:a14="http://schemas.microsoft.com/office/drawing/2010/main" w="9525">
+                <a14:hiddenLine xmlns:a14="http://schemas.microsoft.com/office/drawing/2010/main" xmlns="" w="9525">
                   <a:solidFill>
                     <a:srgbClr val="000000"/>
                   </a:solidFill>
@@ -33621,7 +33621,7 @@
             </a:ln>
             <a:extLst>
               <a:ext uri="{91240B29-F687-4f45-9708-019B960494DF}">
-                <a14:hiddenLine xmlns="" xmlns:a14="http://schemas.microsoft.com/office/drawing/2010/main" w="9525">
+                <a14:hiddenLine xmlns:a14="http://schemas.microsoft.com/office/drawing/2010/main" xmlns="" w="9525">
                   <a:solidFill>
                     <a:srgbClr val="000000"/>
                   </a:solidFill>
@@ -33711,7 +33711,7 @@
             </a:ln>
             <a:extLst>
               <a:ext uri="{91240B29-F687-4f45-9708-019B960494DF}">
-                <a14:hiddenLine xmlns="" xmlns:a14="http://schemas.microsoft.com/office/drawing/2010/main" w="9525">
+                <a14:hiddenLine xmlns:a14="http://schemas.microsoft.com/office/drawing/2010/main" xmlns="" w="9525">
                   <a:solidFill>
                     <a:srgbClr val="000000"/>
                   </a:solidFill>
@@ -33773,7 +33773,7 @@
             </a:ln>
             <a:extLst>
               <a:ext uri="{91240B29-F687-4f45-9708-019B960494DF}">
-                <a14:hiddenLine xmlns="" xmlns:a14="http://schemas.microsoft.com/office/drawing/2010/main" w="9525">
+                <a14:hiddenLine xmlns:a14="http://schemas.microsoft.com/office/drawing/2010/main" xmlns="" w="9525">
                   <a:solidFill>
                     <a:srgbClr val="000000"/>
                   </a:solidFill>
@@ -33835,7 +33835,7 @@
             </a:ln>
             <a:extLst>
               <a:ext uri="{91240B29-F687-4f45-9708-019B960494DF}">
-                <a14:hiddenLine xmlns="" xmlns:a14="http://schemas.microsoft.com/office/drawing/2010/main" w="9525">
+                <a14:hiddenLine xmlns:a14="http://schemas.microsoft.com/office/drawing/2010/main" xmlns="" w="9525">
                   <a:solidFill>
                     <a:srgbClr val="000000"/>
                   </a:solidFill>
@@ -33925,7 +33925,7 @@
             </a:ln>
             <a:extLst>
               <a:ext uri="{91240B29-F687-4f45-9708-019B960494DF}">
-                <a14:hiddenLine xmlns="" xmlns:a14="http://schemas.microsoft.com/office/drawing/2010/main" w="9525">
+                <a14:hiddenLine xmlns:a14="http://schemas.microsoft.com/office/drawing/2010/main" xmlns="" w="9525">
                   <a:solidFill>
                     <a:srgbClr val="000000"/>
                   </a:solidFill>
@@ -34015,7 +34015,7 @@
             </a:ln>
             <a:extLst>
               <a:ext uri="{91240B29-F687-4f45-9708-019B960494DF}">
-                <a14:hiddenLine xmlns="" xmlns:a14="http://schemas.microsoft.com/office/drawing/2010/main" w="9525">
+                <a14:hiddenLine xmlns:a14="http://schemas.microsoft.com/office/drawing/2010/main" xmlns="" w="9525">
                   <a:solidFill>
                     <a:srgbClr val="000000"/>
                   </a:solidFill>
@@ -34077,7 +34077,7 @@
             </a:ln>
             <a:extLst>
               <a:ext uri="{91240B29-F687-4f45-9708-019B960494DF}">
-                <a14:hiddenLine xmlns="" xmlns:a14="http://schemas.microsoft.com/office/drawing/2010/main" w="9525">
+                <a14:hiddenLine xmlns:a14="http://schemas.microsoft.com/office/drawing/2010/main" xmlns="" w="9525">
                   <a:solidFill>
                     <a:srgbClr val="000000"/>
                   </a:solidFill>
@@ -34187,7 +34187,7 @@
             </a:ln>
             <a:extLst>
               <a:ext uri="{91240B29-F687-4f45-9708-019B960494DF}">
-                <a14:hiddenLine xmlns="" xmlns:a14="http://schemas.microsoft.com/office/drawing/2010/main" w="9525">
+                <a14:hiddenLine xmlns:a14="http://schemas.microsoft.com/office/drawing/2010/main" xmlns="" w="9525">
                   <a:solidFill>
                     <a:srgbClr val="000000"/>
                   </a:solidFill>
@@ -34249,7 +34249,7 @@
             </a:ln>
             <a:extLst>
               <a:ext uri="{91240B29-F687-4f45-9708-019B960494DF}">
-                <a14:hiddenLine xmlns="" xmlns:a14="http://schemas.microsoft.com/office/drawing/2010/main" w="9525">
+                <a14:hiddenLine xmlns:a14="http://schemas.microsoft.com/office/drawing/2010/main" xmlns="" w="9525">
                   <a:solidFill>
                     <a:srgbClr val="000000"/>
                   </a:solidFill>
@@ -34339,7 +34339,7 @@
             </a:ln>
             <a:extLst>
               <a:ext uri="{91240B29-F687-4f45-9708-019B960494DF}">
-                <a14:hiddenLine xmlns="" xmlns:a14="http://schemas.microsoft.com/office/drawing/2010/main" w="9525">
+                <a14:hiddenLine xmlns:a14="http://schemas.microsoft.com/office/drawing/2010/main" xmlns="" w="9525">
                   <a:solidFill>
                     <a:srgbClr val="000000"/>
                   </a:solidFill>
@@ -34429,7 +34429,7 @@
             </a:ln>
             <a:extLst>
               <a:ext uri="{91240B29-F687-4f45-9708-019B960494DF}">
-                <a14:hiddenLine xmlns="" xmlns:a14="http://schemas.microsoft.com/office/drawing/2010/main" w="9525">
+                <a14:hiddenLine xmlns:a14="http://schemas.microsoft.com/office/drawing/2010/main" xmlns="" w="9525">
                   <a:solidFill>
                     <a:srgbClr val="000000"/>
                   </a:solidFill>
@@ -34491,7 +34491,7 @@
             </a:ln>
             <a:extLst>
               <a:ext uri="{91240B29-F687-4f45-9708-019B960494DF}">
-                <a14:hiddenLine xmlns="" xmlns:a14="http://schemas.microsoft.com/office/drawing/2010/main" w="9525">
+                <a14:hiddenLine xmlns:a14="http://schemas.microsoft.com/office/drawing/2010/main" xmlns="" w="9525">
                   <a:solidFill>
                     <a:srgbClr val="000000"/>
                   </a:solidFill>
@@ -34581,7 +34581,7 @@
             </a:ln>
             <a:extLst>
               <a:ext uri="{91240B29-F687-4f45-9708-019B960494DF}">
-                <a14:hiddenLine xmlns="" xmlns:a14="http://schemas.microsoft.com/office/drawing/2010/main" w="9525">
+                <a14:hiddenLine xmlns:a14="http://schemas.microsoft.com/office/drawing/2010/main" xmlns="" w="9525">
                   <a:solidFill>
                     <a:srgbClr val="000000"/>
                   </a:solidFill>
@@ -34671,7 +34671,7 @@
             </a:ln>
             <a:extLst>
               <a:ext uri="{91240B29-F687-4f45-9708-019B960494DF}">
-                <a14:hiddenLine xmlns="" xmlns:a14="http://schemas.microsoft.com/office/drawing/2010/main" w="9525">
+                <a14:hiddenLine xmlns:a14="http://schemas.microsoft.com/office/drawing/2010/main" xmlns="" w="9525">
                   <a:solidFill>
                     <a:srgbClr val="000000"/>
                   </a:solidFill>
@@ -34727,7 +34727,7 @@
             </a:ln>
             <a:extLst>
               <a:ext uri="{91240B29-F687-4f45-9708-019B960494DF}">
-                <a14:hiddenLine xmlns="" xmlns:a14="http://schemas.microsoft.com/office/drawing/2010/main" w="9525">
+                <a14:hiddenLine xmlns:a14="http://schemas.microsoft.com/office/drawing/2010/main" xmlns="" w="9525">
                   <a:solidFill>
                     <a:srgbClr val="000000"/>
                   </a:solidFill>
@@ -34817,7 +34817,7 @@
             </a:ln>
             <a:extLst>
               <a:ext uri="{91240B29-F687-4f45-9708-019B960494DF}">
-                <a14:hiddenLine xmlns="" xmlns:a14="http://schemas.microsoft.com/office/drawing/2010/main" w="9525">
+                <a14:hiddenLine xmlns:a14="http://schemas.microsoft.com/office/drawing/2010/main" xmlns="" w="9525">
                   <a:solidFill>
                     <a:srgbClr val="000000"/>
                   </a:solidFill>
@@ -34873,7 +34873,7 @@
             </a:ln>
             <a:extLst>
               <a:ext uri="{91240B29-F687-4f45-9708-019B960494DF}">
-                <a14:hiddenLine xmlns="" xmlns:a14="http://schemas.microsoft.com/office/drawing/2010/main" w="9525">
+                <a14:hiddenLine xmlns:a14="http://schemas.microsoft.com/office/drawing/2010/main" xmlns="" w="9525">
                   <a:solidFill>
                     <a:srgbClr val="000000"/>
                   </a:solidFill>
@@ -34963,7 +34963,7 @@
             </a:ln>
             <a:extLst>
               <a:ext uri="{91240B29-F687-4f45-9708-019B960494DF}">
-                <a14:hiddenLine xmlns="" xmlns:a14="http://schemas.microsoft.com/office/drawing/2010/main" w="9525">
+                <a14:hiddenLine xmlns:a14="http://schemas.microsoft.com/office/drawing/2010/main" xmlns="" w="9525">
                   <a:solidFill>
                     <a:srgbClr val="000000"/>
                   </a:solidFill>
@@ -35031,7 +35031,7 @@
             </a:ln>
             <a:extLst>
               <a:ext uri="{91240B29-F687-4f45-9708-019B960494DF}">
-                <a14:hiddenLine xmlns="" xmlns:a14="http://schemas.microsoft.com/office/drawing/2010/main" w="9525">
+                <a14:hiddenLine xmlns:a14="http://schemas.microsoft.com/office/drawing/2010/main" xmlns="" w="9525">
                   <a:solidFill>
                     <a:srgbClr val="000000"/>
                   </a:solidFill>
@@ -35121,7 +35121,7 @@
             </a:ln>
             <a:extLst>
               <a:ext uri="{91240B29-F687-4f45-9708-019B960494DF}">
-                <a14:hiddenLine xmlns="" xmlns:a14="http://schemas.microsoft.com/office/drawing/2010/main" w="9525">
+                <a14:hiddenLine xmlns:a14="http://schemas.microsoft.com/office/drawing/2010/main" xmlns="" w="9525">
                   <a:solidFill>
                     <a:srgbClr val="000000"/>
                   </a:solidFill>
@@ -35189,7 +35189,7 @@
             </a:ln>
             <a:extLst>
               <a:ext uri="{91240B29-F687-4f45-9708-019B960494DF}">
-                <a14:hiddenLine xmlns="" xmlns:a14="http://schemas.microsoft.com/office/drawing/2010/main" w="9525">
+                <a14:hiddenLine xmlns:a14="http://schemas.microsoft.com/office/drawing/2010/main" xmlns="" w="9525">
                   <a:solidFill>
                     <a:srgbClr val="000000"/>
                   </a:solidFill>
@@ -35279,7 +35279,7 @@
             </a:ln>
             <a:extLst>
               <a:ext uri="{91240B29-F687-4f45-9708-019B960494DF}">
-                <a14:hiddenLine xmlns="" xmlns:a14="http://schemas.microsoft.com/office/drawing/2010/main" w="9525">
+                <a14:hiddenLine xmlns:a14="http://schemas.microsoft.com/office/drawing/2010/main" xmlns="" w="9525">
                   <a:solidFill>
                     <a:srgbClr val="000000"/>
                   </a:solidFill>
@@ -35313,7 +35313,7 @@
             </a:ln>
             <a:extLst>
               <a:ext uri="{91240B29-F687-4f45-9708-019B960494DF}">
-                <a14:hiddenLine xmlns="" xmlns:a14="http://schemas.microsoft.com/office/drawing/2010/main" w="9525">
+                <a14:hiddenLine xmlns:a14="http://schemas.microsoft.com/office/drawing/2010/main" xmlns="" w="9525">
                   <a:solidFill>
                     <a:srgbClr val="000000"/>
                   </a:solidFill>
@@ -35403,7 +35403,7 @@
             </a:ln>
             <a:extLst>
               <a:ext uri="{91240B29-F687-4f45-9708-019B960494DF}">
-                <a14:hiddenLine xmlns="" xmlns:a14="http://schemas.microsoft.com/office/drawing/2010/main" w="9525">
+                <a14:hiddenLine xmlns:a14="http://schemas.microsoft.com/office/drawing/2010/main" xmlns="" w="9525">
                   <a:solidFill>
                     <a:srgbClr val="000000"/>
                   </a:solidFill>
@@ -35465,7 +35465,7 @@
             </a:ln>
             <a:extLst>
               <a:ext uri="{91240B29-F687-4f45-9708-019B960494DF}">
-                <a14:hiddenLine xmlns="" xmlns:a14="http://schemas.microsoft.com/office/drawing/2010/main" w="9525">
+                <a14:hiddenLine xmlns:a14="http://schemas.microsoft.com/office/drawing/2010/main" xmlns="" w="9525">
                   <a:solidFill>
                     <a:srgbClr val="000000"/>
                   </a:solidFill>
@@ -35527,7 +35527,7 @@
             </a:ln>
             <a:extLst>
               <a:ext uri="{91240B29-F687-4f45-9708-019B960494DF}">
-                <a14:hiddenLine xmlns="" xmlns:a14="http://schemas.microsoft.com/office/drawing/2010/main" w="9525">
+                <a14:hiddenLine xmlns:a14="http://schemas.microsoft.com/office/drawing/2010/main" xmlns="" w="9525">
                   <a:solidFill>
                     <a:srgbClr val="000000"/>
                   </a:solidFill>
@@ -35617,7 +35617,7 @@
             </a:ln>
             <a:extLst>
               <a:ext uri="{91240B29-F687-4f45-9708-019B960494DF}">
-                <a14:hiddenLine xmlns="" xmlns:a14="http://schemas.microsoft.com/office/drawing/2010/main" w="9525">
+                <a14:hiddenLine xmlns:a14="http://schemas.microsoft.com/office/drawing/2010/main" xmlns="" w="9525">
                   <a:solidFill>
                     <a:srgbClr val="000000"/>
                   </a:solidFill>
@@ -35685,7 +35685,7 @@
             </a:ln>
             <a:extLst>
               <a:ext uri="{91240B29-F687-4f45-9708-019B960494DF}">
-                <a14:hiddenLine xmlns="" xmlns:a14="http://schemas.microsoft.com/office/drawing/2010/main" w="9525">
+                <a14:hiddenLine xmlns:a14="http://schemas.microsoft.com/office/drawing/2010/main" xmlns="" w="9525">
                   <a:solidFill>
                     <a:srgbClr val="000000"/>
                   </a:solidFill>
@@ -35747,7 +35747,7 @@
             </a:ln>
             <a:extLst>
               <a:ext uri="{91240B29-F687-4f45-9708-019B960494DF}">
-                <a14:hiddenLine xmlns="" xmlns:a14="http://schemas.microsoft.com/office/drawing/2010/main" w="9525">
+                <a14:hiddenLine xmlns:a14="http://schemas.microsoft.com/office/drawing/2010/main" xmlns="" w="9525">
                   <a:solidFill>
                     <a:srgbClr val="000000"/>
                   </a:solidFill>
@@ -35837,7 +35837,7 @@
             </a:ln>
             <a:extLst>
               <a:ext uri="{91240B29-F687-4f45-9708-019B960494DF}">
-                <a14:hiddenLine xmlns="" xmlns:a14="http://schemas.microsoft.com/office/drawing/2010/main" w="9525">
+                <a14:hiddenLine xmlns:a14="http://schemas.microsoft.com/office/drawing/2010/main" xmlns="" w="9525">
                   <a:solidFill>
                     <a:srgbClr val="000000"/>
                   </a:solidFill>
@@ -35899,7 +35899,7 @@
             </a:ln>
             <a:extLst>
               <a:ext uri="{91240B29-F687-4f45-9708-019B960494DF}">
-                <a14:hiddenLine xmlns="" xmlns:a14="http://schemas.microsoft.com/office/drawing/2010/main" w="9525">
+                <a14:hiddenLine xmlns:a14="http://schemas.microsoft.com/office/drawing/2010/main" xmlns="" w="9525">
                   <a:solidFill>
                     <a:srgbClr val="000000"/>
                   </a:solidFill>
@@ -35989,7 +35989,7 @@
             </a:ln>
             <a:extLst>
               <a:ext uri="{91240B29-F687-4f45-9708-019B960494DF}">
-                <a14:hiddenLine xmlns="" xmlns:a14="http://schemas.microsoft.com/office/drawing/2010/main" w="9525">
+                <a14:hiddenLine xmlns:a14="http://schemas.microsoft.com/office/drawing/2010/main" xmlns="" w="9525">
                   <a:solidFill>
                     <a:srgbClr val="000000"/>
                   </a:solidFill>
@@ -36051,7 +36051,7 @@
             </a:ln>
             <a:extLst>
               <a:ext uri="{91240B29-F687-4f45-9708-019B960494DF}">
-                <a14:hiddenLine xmlns="" xmlns:a14="http://schemas.microsoft.com/office/drawing/2010/main" w="9525">
+                <a14:hiddenLine xmlns:a14="http://schemas.microsoft.com/office/drawing/2010/main" xmlns="" w="9525">
                   <a:solidFill>
                     <a:srgbClr val="000000"/>
                   </a:solidFill>
@@ -36141,7 +36141,7 @@
             </a:ln>
             <a:extLst>
               <a:ext uri="{91240B29-F687-4f45-9708-019B960494DF}">
-                <a14:hiddenLine xmlns="" xmlns:a14="http://schemas.microsoft.com/office/drawing/2010/main" w="9525">
+                <a14:hiddenLine xmlns:a14="http://schemas.microsoft.com/office/drawing/2010/main" xmlns="" w="9525">
                   <a:solidFill>
                     <a:srgbClr val="000000"/>
                   </a:solidFill>
@@ -36175,7 +36175,7 @@
             </a:ln>
             <a:extLst>
               <a:ext uri="{91240B29-F687-4f45-9708-019B960494DF}">
-                <a14:hiddenLine xmlns="" xmlns:a14="http://schemas.microsoft.com/office/drawing/2010/main" w="9525">
+                <a14:hiddenLine xmlns:a14="http://schemas.microsoft.com/office/drawing/2010/main" xmlns="" w="9525">
                   <a:solidFill>
                     <a:srgbClr val="000000"/>
                   </a:solidFill>
@@ -36240,7 +36240,7 @@
             </a:ln>
             <a:extLst>
               <a:ext uri="{91240B29-F687-4f45-9708-019B960494DF}">
-                <a14:hiddenLine xmlns="" xmlns:a14="http://schemas.microsoft.com/office/drawing/2010/main" w="9525">
+                <a14:hiddenLine xmlns:a14="http://schemas.microsoft.com/office/drawing/2010/main" xmlns="" w="9525">
                   <a:solidFill>
                     <a:srgbClr val="000000"/>
                   </a:solidFill>
@@ -36330,7 +36330,7 @@
             </a:ln>
             <a:extLst>
               <a:ext uri="{91240B29-F687-4f45-9708-019B960494DF}">
-                <a14:hiddenLine xmlns="" xmlns:a14="http://schemas.microsoft.com/office/drawing/2010/main" w="9525">
+                <a14:hiddenLine xmlns:a14="http://schemas.microsoft.com/office/drawing/2010/main" xmlns="" w="9525">
                   <a:solidFill>
                     <a:srgbClr val="000000"/>
                   </a:solidFill>
@@ -36392,7 +36392,7 @@
             </a:ln>
             <a:extLst>
               <a:ext uri="{91240B29-F687-4f45-9708-019B960494DF}">
-                <a14:hiddenLine xmlns="" xmlns:a14="http://schemas.microsoft.com/office/drawing/2010/main" w="9525">
+                <a14:hiddenLine xmlns:a14="http://schemas.microsoft.com/office/drawing/2010/main" xmlns="" w="9525">
                   <a:solidFill>
                     <a:srgbClr val="000000"/>
                   </a:solidFill>
@@ -36482,7 +36482,7 @@
             </a:ln>
             <a:extLst>
               <a:ext uri="{91240B29-F687-4f45-9708-019B960494DF}">
-                <a14:hiddenLine xmlns="" xmlns:a14="http://schemas.microsoft.com/office/drawing/2010/main" w="9525">
+                <a14:hiddenLine xmlns:a14="http://schemas.microsoft.com/office/drawing/2010/main" xmlns="" w="9525">
                   <a:solidFill>
                     <a:srgbClr val="000000"/>
                   </a:solidFill>
@@ -36572,7 +36572,7 @@
             </a:ln>
             <a:extLst>
               <a:ext uri="{91240B29-F687-4f45-9708-019B960494DF}">
-                <a14:hiddenLine xmlns="" xmlns:a14="http://schemas.microsoft.com/office/drawing/2010/main" w="9525">
+                <a14:hiddenLine xmlns:a14="http://schemas.microsoft.com/office/drawing/2010/main" xmlns="" w="9525">
                   <a:solidFill>
                     <a:srgbClr val="000000"/>
                   </a:solidFill>
@@ -36637,7 +36637,7 @@
             </a:ln>
             <a:extLst>
               <a:ext uri="{91240B29-F687-4f45-9708-019B960494DF}">
-                <a14:hiddenLine xmlns="" xmlns:a14="http://schemas.microsoft.com/office/drawing/2010/main" w="9525">
+                <a14:hiddenLine xmlns:a14="http://schemas.microsoft.com/office/drawing/2010/main" xmlns="" w="9525">
                   <a:solidFill>
                     <a:srgbClr val="000000"/>
                   </a:solidFill>
@@ -36699,7 +36699,7 @@
             </a:ln>
             <a:extLst>
               <a:ext uri="{91240B29-F687-4f45-9708-019B960494DF}">
-                <a14:hiddenLine xmlns="" xmlns:a14="http://schemas.microsoft.com/office/drawing/2010/main" w="9525">
+                <a14:hiddenLine xmlns:a14="http://schemas.microsoft.com/office/drawing/2010/main" xmlns="" w="9525">
                   <a:solidFill>
                     <a:srgbClr val="000000"/>
                   </a:solidFill>
@@ -36789,7 +36789,7 @@
             </a:ln>
             <a:extLst>
               <a:ext uri="{91240B29-F687-4f45-9708-019B960494DF}">
-                <a14:hiddenLine xmlns="" xmlns:a14="http://schemas.microsoft.com/office/drawing/2010/main" w="9525">
+                <a14:hiddenLine xmlns:a14="http://schemas.microsoft.com/office/drawing/2010/main" xmlns="" w="9525">
                   <a:solidFill>
                     <a:srgbClr val="000000"/>
                   </a:solidFill>
@@ -36879,7 +36879,7 @@
             </a:ln>
             <a:extLst>
               <a:ext uri="{91240B29-F687-4f45-9708-019B960494DF}">
-                <a14:hiddenLine xmlns="" xmlns:a14="http://schemas.microsoft.com/office/drawing/2010/main" w="9525">
+                <a14:hiddenLine xmlns:a14="http://schemas.microsoft.com/office/drawing/2010/main" xmlns="" w="9525">
                   <a:solidFill>
                     <a:srgbClr val="000000"/>
                   </a:solidFill>
@@ -36941,7 +36941,7 @@
             </a:ln>
             <a:extLst>
               <a:ext uri="{91240B29-F687-4f45-9708-019B960494DF}">
-                <a14:hiddenLine xmlns="" xmlns:a14="http://schemas.microsoft.com/office/drawing/2010/main" w="9525">
+                <a14:hiddenLine xmlns:a14="http://schemas.microsoft.com/office/drawing/2010/main" xmlns="" w="9525">
                   <a:solidFill>
                     <a:srgbClr val="000000"/>
                   </a:solidFill>
@@ -37061,7 +37061,7 @@
             </a:ln>
             <a:extLst>
               <a:ext uri="{91240B29-F687-4f45-9708-019B960494DF}">
-                <a14:hiddenLine xmlns="" xmlns:a14="http://schemas.microsoft.com/office/drawing/2010/main" w="9525">
+                <a14:hiddenLine xmlns:a14="http://schemas.microsoft.com/office/drawing/2010/main" xmlns="" w="9525">
                   <a:solidFill>
                     <a:srgbClr val="000000"/>
                   </a:solidFill>
@@ -37129,7 +37129,7 @@
             </a:ln>
             <a:extLst>
               <a:ext uri="{91240B29-F687-4f45-9708-019B960494DF}">
-                <a14:hiddenLine xmlns="" xmlns:a14="http://schemas.microsoft.com/office/drawing/2010/main" w="9525">
+                <a14:hiddenLine xmlns:a14="http://schemas.microsoft.com/office/drawing/2010/main" xmlns="" w="9525">
                   <a:solidFill>
                     <a:srgbClr val="000000"/>
                   </a:solidFill>
@@ -37219,7 +37219,7 @@
             </a:ln>
             <a:extLst>
               <a:ext uri="{91240B29-F687-4f45-9708-019B960494DF}">
-                <a14:hiddenLine xmlns="" xmlns:a14="http://schemas.microsoft.com/office/drawing/2010/main" w="9525">
+                <a14:hiddenLine xmlns:a14="http://schemas.microsoft.com/office/drawing/2010/main" xmlns="" w="9525">
                   <a:solidFill>
                     <a:srgbClr val="000000"/>
                   </a:solidFill>
@@ -37359,7 +37359,7 @@
           <a:p>
             <a:fld id="{3C358F7A-A1BB-5840-8499-149F7011A223}" type="datetimeFigureOut">
               <a:rPr lang="en-US" smtClean="0"/>
-              <a:t>4/27/20</a:t>
+              <a:t>4/29/20</a:t>
             </a:fld>
             <a:endParaRPr lang="en-US"/>
           </a:p>
@@ -37626,7 +37626,7 @@
           <a:p>
             <a:fld id="{3C358F7A-A1BB-5840-8499-149F7011A223}" type="datetimeFigureOut">
               <a:rPr lang="en-US" smtClean="0"/>
-              <a:t>4/27/20</a:t>
+              <a:t>4/29/20</a:t>
             </a:fld>
             <a:endParaRPr lang="en-US"/>
           </a:p>
@@ -37822,7 +37822,7 @@
           <a:p>
             <a:fld id="{3C358F7A-A1BB-5840-8499-149F7011A223}" type="datetimeFigureOut">
               <a:rPr lang="en-US" smtClean="0"/>
-              <a:t>4/27/20</a:t>
+              <a:t>4/29/20</a:t>
             </a:fld>
             <a:endParaRPr lang="en-US"/>
           </a:p>
@@ -38085,7 +38085,7 @@
           <a:p>
             <a:fld id="{3C358F7A-A1BB-5840-8499-149F7011A223}" type="datetimeFigureOut">
               <a:rPr lang="en-US" smtClean="0"/>
-              <a:t>4/27/20</a:t>
+              <a:t>4/29/20</a:t>
             </a:fld>
             <a:endParaRPr lang="en-US"/>
           </a:p>
@@ -38519,7 +38519,7 @@
           <a:p>
             <a:fld id="{3C358F7A-A1BB-5840-8499-149F7011A223}" type="datetimeFigureOut">
               <a:rPr lang="en-US" smtClean="0"/>
-              <a:t>4/27/20</a:t>
+              <a:t>4/29/20</a:t>
             </a:fld>
             <a:endParaRPr lang="en-US"/>
           </a:p>
@@ -39065,7 +39065,7 @@
           <a:p>
             <a:fld id="{3C358F7A-A1BB-5840-8499-149F7011A223}" type="datetimeFigureOut">
               <a:rPr lang="en-US" smtClean="0"/>
-              <a:t>4/27/20</a:t>
+              <a:t>4/29/20</a:t>
             </a:fld>
             <a:endParaRPr lang="en-US"/>
           </a:p>
@@ -39785,7 +39785,7 @@
           <a:p>
             <a:fld id="{3C358F7A-A1BB-5840-8499-149F7011A223}" type="datetimeFigureOut">
               <a:rPr lang="en-US" smtClean="0"/>
-              <a:t>4/27/20</a:t>
+              <a:t>4/29/20</a:t>
             </a:fld>
             <a:endParaRPr lang="en-US"/>
           </a:p>
@@ -39955,7 +39955,7 @@
           <a:p>
             <a:fld id="{3C358F7A-A1BB-5840-8499-149F7011A223}" type="datetimeFigureOut">
               <a:rPr lang="en-US" smtClean="0"/>
-              <a:t>4/27/20</a:t>
+              <a:t>4/29/20</a:t>
             </a:fld>
             <a:endParaRPr lang="en-US"/>
           </a:p>
@@ -40135,7 +40135,7 @@
           <a:p>
             <a:fld id="{3C358F7A-A1BB-5840-8499-149F7011A223}" type="datetimeFigureOut">
               <a:rPr lang="en-US" smtClean="0"/>
-              <a:t>4/27/20</a:t>
+              <a:t>4/29/20</a:t>
             </a:fld>
             <a:endParaRPr lang="en-US"/>
           </a:p>
@@ -40305,7 +40305,7 @@
           <a:p>
             <a:fld id="{3C358F7A-A1BB-5840-8499-149F7011A223}" type="datetimeFigureOut">
               <a:rPr lang="en-US" smtClean="0"/>
-              <a:t>4/27/20</a:t>
+              <a:t>4/29/20</a:t>
             </a:fld>
             <a:endParaRPr lang="en-US"/>
           </a:p>
@@ -40555,7 +40555,7 @@
           <a:p>
             <a:fld id="{3C358F7A-A1BB-5840-8499-149F7011A223}" type="datetimeFigureOut">
               <a:rPr lang="en-US" smtClean="0"/>
-              <a:t>4/27/20</a:t>
+              <a:t>4/29/20</a:t>
             </a:fld>
             <a:endParaRPr lang="en-US"/>
           </a:p>
@@ -40787,7 +40787,7 @@
           <a:p>
             <a:fld id="{3C358F7A-A1BB-5840-8499-149F7011A223}" type="datetimeFigureOut">
               <a:rPr lang="en-US" smtClean="0"/>
-              <a:t>4/27/20</a:t>
+              <a:t>4/29/20</a:t>
             </a:fld>
             <a:endParaRPr lang="en-US"/>
           </a:p>
@@ -41168,7 +41168,7 @@
           <a:p>
             <a:fld id="{3C358F7A-A1BB-5840-8499-149F7011A223}" type="datetimeFigureOut">
               <a:rPr lang="en-US" smtClean="0"/>
-              <a:t>4/27/20</a:t>
+              <a:t>4/29/20</a:t>
             </a:fld>
             <a:endParaRPr lang="en-US"/>
           </a:p>
@@ -41286,7 +41286,7 @@
           <a:p>
             <a:fld id="{3C358F7A-A1BB-5840-8499-149F7011A223}" type="datetimeFigureOut">
               <a:rPr lang="en-US" smtClean="0"/>
-              <a:t>4/27/20</a:t>
+              <a:t>4/29/20</a:t>
             </a:fld>
             <a:endParaRPr lang="en-US"/>
           </a:p>
@@ -41381,7 +41381,7 @@
           <a:p>
             <a:fld id="{3C358F7A-A1BB-5840-8499-149F7011A223}" type="datetimeFigureOut">
               <a:rPr lang="en-US" smtClean="0"/>
-              <a:t>4/27/20</a:t>
+              <a:t>4/29/20</a:t>
             </a:fld>
             <a:endParaRPr lang="en-US"/>
           </a:p>
@@ -41630,7 +41630,7 @@
           <a:p>
             <a:fld id="{3C358F7A-A1BB-5840-8499-149F7011A223}" type="datetimeFigureOut">
               <a:rPr lang="en-US" smtClean="0"/>
-              <a:t>4/27/20</a:t>
+              <a:t>4/29/20</a:t>
             </a:fld>
             <a:endParaRPr lang="en-US"/>
           </a:p>
@@ -41910,7 +41910,7 @@
           <a:p>
             <a:fld id="{3C358F7A-A1BB-5840-8499-149F7011A223}" type="datetimeFigureOut">
               <a:rPr lang="en-US" smtClean="0"/>
-              <a:t>4/27/20</a:t>
+              <a:t>4/29/20</a:t>
             </a:fld>
             <a:endParaRPr lang="en-US"/>
           </a:p>
@@ -42026,7 +42026,7 @@
           <a:noFill/>
           <a:extLst>
             <a:ext uri="{909E8E84-426E-40dd-AFC4-6F175D3DCCD1}">
-              <a14:hiddenFill xmlns="" xmlns:a14="http://schemas.microsoft.com/office/drawing/2010/main">
+              <a14:hiddenFill xmlns:a14="http://schemas.microsoft.com/office/drawing/2010/main" xmlns="">
                 <a:solidFill>
                   <a:srgbClr val="FFFFFF"/>
                 </a:solidFill>
@@ -42100,7 +42100,7 @@
               </a:ln>
               <a:extLst>
                 <a:ext uri="{91240B29-F687-4f45-9708-019B960494DF}">
-                  <a14:hiddenLine xmlns="" xmlns:a14="http://schemas.microsoft.com/office/drawing/2010/main" w="9525">
+                  <a14:hiddenLine xmlns:a14="http://schemas.microsoft.com/office/drawing/2010/main" xmlns="" w="9525">
                     <a:solidFill>
                       <a:srgbClr val="000000"/>
                     </a:solidFill>
@@ -42190,7 +42190,7 @@
               </a:ln>
               <a:extLst>
                 <a:ext uri="{91240B29-F687-4f45-9708-019B960494DF}">
-                  <a14:hiddenLine xmlns="" xmlns:a14="http://schemas.microsoft.com/office/drawing/2010/main" w="9525">
+                  <a14:hiddenLine xmlns:a14="http://schemas.microsoft.com/office/drawing/2010/main" xmlns="" w="9525">
                     <a:solidFill>
                       <a:srgbClr val="000000"/>
                     </a:solidFill>
@@ -42280,7 +42280,7 @@
               </a:ln>
               <a:extLst>
                 <a:ext uri="{91240B29-F687-4f45-9708-019B960494DF}">
-                  <a14:hiddenLine xmlns="" xmlns:a14="http://schemas.microsoft.com/office/drawing/2010/main" w="9525">
+                  <a14:hiddenLine xmlns:a14="http://schemas.microsoft.com/office/drawing/2010/main" xmlns="" w="9525">
                     <a:solidFill>
                       <a:srgbClr val="000000"/>
                     </a:solidFill>
@@ -42342,7 +42342,7 @@
               </a:ln>
               <a:extLst>
                 <a:ext uri="{91240B29-F687-4f45-9708-019B960494DF}">
-                  <a14:hiddenLine xmlns="" xmlns:a14="http://schemas.microsoft.com/office/drawing/2010/main" w="9525">
+                  <a14:hiddenLine xmlns:a14="http://schemas.microsoft.com/office/drawing/2010/main" xmlns="" w="9525">
                     <a:solidFill>
                       <a:srgbClr val="000000"/>
                     </a:solidFill>
@@ -42432,7 +42432,7 @@
               </a:ln>
               <a:extLst>
                 <a:ext uri="{91240B29-F687-4f45-9708-019B960494DF}">
-                  <a14:hiddenLine xmlns="" xmlns:a14="http://schemas.microsoft.com/office/drawing/2010/main" w="9525">
+                  <a14:hiddenLine xmlns:a14="http://schemas.microsoft.com/office/drawing/2010/main" xmlns="" w="9525">
                     <a:solidFill>
                       <a:srgbClr val="000000"/>
                     </a:solidFill>
@@ -42494,7 +42494,7 @@
               </a:ln>
               <a:extLst>
                 <a:ext uri="{91240B29-F687-4f45-9708-019B960494DF}">
-                  <a14:hiddenLine xmlns="" xmlns:a14="http://schemas.microsoft.com/office/drawing/2010/main" w="9525">
+                  <a14:hiddenLine xmlns:a14="http://schemas.microsoft.com/office/drawing/2010/main" xmlns="" w="9525">
                     <a:solidFill>
                       <a:srgbClr val="000000"/>
                     </a:solidFill>
@@ -42556,7 +42556,7 @@
               </a:ln>
               <a:extLst>
                 <a:ext uri="{91240B29-F687-4f45-9708-019B960494DF}">
-                  <a14:hiddenLine xmlns="" xmlns:a14="http://schemas.microsoft.com/office/drawing/2010/main" w="9525">
+                  <a14:hiddenLine xmlns:a14="http://schemas.microsoft.com/office/drawing/2010/main" xmlns="" w="9525">
                     <a:solidFill>
                       <a:srgbClr val="000000"/>
                     </a:solidFill>
@@ -42646,7 +42646,7 @@
               </a:ln>
               <a:extLst>
                 <a:ext uri="{91240B29-F687-4f45-9708-019B960494DF}">
-                  <a14:hiddenLine xmlns="" xmlns:a14="http://schemas.microsoft.com/office/drawing/2010/main" w="9525">
+                  <a14:hiddenLine xmlns:a14="http://schemas.microsoft.com/office/drawing/2010/main" xmlns="" w="9525">
                     <a:solidFill>
                       <a:srgbClr val="000000"/>
                     </a:solidFill>
@@ -42736,7 +42736,7 @@
               </a:ln>
               <a:extLst>
                 <a:ext uri="{91240B29-F687-4f45-9708-019B960494DF}">
-                  <a14:hiddenLine xmlns="" xmlns:a14="http://schemas.microsoft.com/office/drawing/2010/main" w="9525">
+                  <a14:hiddenLine xmlns:a14="http://schemas.microsoft.com/office/drawing/2010/main" xmlns="" w="9525">
                     <a:solidFill>
                       <a:srgbClr val="000000"/>
                     </a:solidFill>
@@ -42798,7 +42798,7 @@
               </a:ln>
               <a:extLst>
                 <a:ext uri="{91240B29-F687-4f45-9708-019B960494DF}">
-                  <a14:hiddenLine xmlns="" xmlns:a14="http://schemas.microsoft.com/office/drawing/2010/main" w="9525">
+                  <a14:hiddenLine xmlns:a14="http://schemas.microsoft.com/office/drawing/2010/main" xmlns="" w="9525">
                     <a:solidFill>
                       <a:srgbClr val="000000"/>
                     </a:solidFill>
@@ -42908,7 +42908,7 @@
               </a:ln>
               <a:extLst>
                 <a:ext uri="{91240B29-F687-4f45-9708-019B960494DF}">
-                  <a14:hiddenLine xmlns="" xmlns:a14="http://schemas.microsoft.com/office/drawing/2010/main" w="9525">
+                  <a14:hiddenLine xmlns:a14="http://schemas.microsoft.com/office/drawing/2010/main" xmlns="" w="9525">
                     <a:solidFill>
                       <a:srgbClr val="000000"/>
                     </a:solidFill>
@@ -42992,7 +42992,7 @@
               </a:ln>
               <a:extLst>
                 <a:ext uri="{91240B29-F687-4f45-9708-019B960494DF}">
-                  <a14:hiddenLine xmlns="" xmlns:a14="http://schemas.microsoft.com/office/drawing/2010/main" w="9525">
+                  <a14:hiddenLine xmlns:a14="http://schemas.microsoft.com/office/drawing/2010/main" xmlns="" w="9525">
                     <a:solidFill>
                       <a:srgbClr val="000000"/>
                     </a:solidFill>
@@ -43054,7 +43054,7 @@
               </a:ln>
               <a:extLst>
                 <a:ext uri="{91240B29-F687-4f45-9708-019B960494DF}">
-                  <a14:hiddenLine xmlns="" xmlns:a14="http://schemas.microsoft.com/office/drawing/2010/main" w="9525">
+                  <a14:hiddenLine xmlns:a14="http://schemas.microsoft.com/office/drawing/2010/main" xmlns="" w="9525">
                     <a:solidFill>
                       <a:srgbClr val="000000"/>
                     </a:solidFill>
@@ -43116,7 +43116,7 @@
               </a:ln>
               <a:extLst>
                 <a:ext uri="{91240B29-F687-4f45-9708-019B960494DF}">
-                  <a14:hiddenLine xmlns="" xmlns:a14="http://schemas.microsoft.com/office/drawing/2010/main" w="9525">
+                  <a14:hiddenLine xmlns:a14="http://schemas.microsoft.com/office/drawing/2010/main" xmlns="" w="9525">
                     <a:solidFill>
                       <a:srgbClr val="000000"/>
                     </a:solidFill>
@@ -43206,7 +43206,7 @@
               </a:ln>
               <a:extLst>
                 <a:ext uri="{91240B29-F687-4f45-9708-019B960494DF}">
-                  <a14:hiddenLine xmlns="" xmlns:a14="http://schemas.microsoft.com/office/drawing/2010/main" w="9525">
+                  <a14:hiddenLine xmlns:a14="http://schemas.microsoft.com/office/drawing/2010/main" xmlns="" w="9525">
                     <a:solidFill>
                       <a:srgbClr val="000000"/>
                     </a:solidFill>
@@ -43240,7 +43240,7 @@
               </a:ln>
               <a:extLst>
                 <a:ext uri="{91240B29-F687-4f45-9708-019B960494DF}">
-                  <a14:hiddenLine xmlns="" xmlns:a14="http://schemas.microsoft.com/office/drawing/2010/main" w="9525">
+                  <a14:hiddenLine xmlns:a14="http://schemas.microsoft.com/office/drawing/2010/main" xmlns="" w="9525">
                     <a:solidFill>
                       <a:srgbClr val="000000"/>
                     </a:solidFill>
@@ -43305,7 +43305,7 @@
               </a:ln>
               <a:extLst>
                 <a:ext uri="{91240B29-F687-4f45-9708-019B960494DF}">
-                  <a14:hiddenLine xmlns="" xmlns:a14="http://schemas.microsoft.com/office/drawing/2010/main" w="9525">
+                  <a14:hiddenLine xmlns:a14="http://schemas.microsoft.com/office/drawing/2010/main" xmlns="" w="9525">
                     <a:solidFill>
                       <a:srgbClr val="000000"/>
                     </a:solidFill>
@@ -43395,7 +43395,7 @@
               </a:ln>
               <a:extLst>
                 <a:ext uri="{91240B29-F687-4f45-9708-019B960494DF}">
-                  <a14:hiddenLine xmlns="" xmlns:a14="http://schemas.microsoft.com/office/drawing/2010/main" w="9525">
+                  <a14:hiddenLine xmlns:a14="http://schemas.microsoft.com/office/drawing/2010/main" xmlns="" w="9525">
                     <a:solidFill>
                       <a:srgbClr val="000000"/>
                     </a:solidFill>
@@ -43457,7 +43457,7 @@
               </a:ln>
               <a:extLst>
                 <a:ext uri="{91240B29-F687-4f45-9708-019B960494DF}">
-                  <a14:hiddenLine xmlns="" xmlns:a14="http://schemas.microsoft.com/office/drawing/2010/main" w="9525">
+                  <a14:hiddenLine xmlns:a14="http://schemas.microsoft.com/office/drawing/2010/main" xmlns="" w="9525">
                     <a:solidFill>
                       <a:srgbClr val="000000"/>
                     </a:solidFill>
@@ -43547,7 +43547,7 @@
               </a:ln>
               <a:extLst>
                 <a:ext uri="{91240B29-F687-4f45-9708-019B960494DF}">
-                  <a14:hiddenLine xmlns="" xmlns:a14="http://schemas.microsoft.com/office/drawing/2010/main" w="9525">
+                  <a14:hiddenLine xmlns:a14="http://schemas.microsoft.com/office/drawing/2010/main" xmlns="" w="9525">
                     <a:solidFill>
                       <a:srgbClr val="000000"/>
                     </a:solidFill>
@@ -43612,7 +43612,7 @@
               </a:ln>
               <a:extLst>
                 <a:ext uri="{91240B29-F687-4f45-9708-019B960494DF}">
-                  <a14:hiddenLine xmlns="" xmlns:a14="http://schemas.microsoft.com/office/drawing/2010/main" w="9525">
+                  <a14:hiddenLine xmlns:a14="http://schemas.microsoft.com/office/drawing/2010/main" xmlns="" w="9525">
                     <a:solidFill>
                       <a:srgbClr val="000000"/>
                     </a:solidFill>
@@ -43674,7 +43674,7 @@
               </a:ln>
               <a:extLst>
                 <a:ext uri="{91240B29-F687-4f45-9708-019B960494DF}">
-                  <a14:hiddenLine xmlns="" xmlns:a14="http://schemas.microsoft.com/office/drawing/2010/main" w="9525">
+                  <a14:hiddenLine xmlns:a14="http://schemas.microsoft.com/office/drawing/2010/main" xmlns="" w="9525">
                     <a:solidFill>
                       <a:srgbClr val="000000"/>
                     </a:solidFill>
@@ -43764,7 +43764,7 @@
               </a:ln>
               <a:extLst>
                 <a:ext uri="{91240B29-F687-4f45-9708-019B960494DF}">
-                  <a14:hiddenLine xmlns="" xmlns:a14="http://schemas.microsoft.com/office/drawing/2010/main" w="9525">
+                  <a14:hiddenLine xmlns:a14="http://schemas.microsoft.com/office/drawing/2010/main" xmlns="" w="9525">
                     <a:solidFill>
                       <a:srgbClr val="000000"/>
                     </a:solidFill>
@@ -43854,7 +43854,7 @@
               </a:ln>
               <a:extLst>
                 <a:ext uri="{91240B29-F687-4f45-9708-019B960494DF}">
-                  <a14:hiddenLine xmlns="" xmlns:a14="http://schemas.microsoft.com/office/drawing/2010/main" w="9525">
+                  <a14:hiddenLine xmlns:a14="http://schemas.microsoft.com/office/drawing/2010/main" xmlns="" w="9525">
                     <a:solidFill>
                       <a:srgbClr val="000000"/>
                     </a:solidFill>
@@ -43919,7 +43919,7 @@
               </a:ln>
               <a:extLst>
                 <a:ext uri="{91240B29-F687-4f45-9708-019B960494DF}">
-                  <a14:hiddenLine xmlns="" xmlns:a14="http://schemas.microsoft.com/office/drawing/2010/main" w="9525">
+                  <a14:hiddenLine xmlns:a14="http://schemas.microsoft.com/office/drawing/2010/main" xmlns="" w="9525">
                     <a:solidFill>
                       <a:srgbClr val="000000"/>
                     </a:solidFill>
@@ -44039,7 +44039,7 @@
               </a:ln>
               <a:extLst>
                 <a:ext uri="{91240B29-F687-4f45-9708-019B960494DF}">
-                  <a14:hiddenLine xmlns="" xmlns:a14="http://schemas.microsoft.com/office/drawing/2010/main" w="9525">
+                  <a14:hiddenLine xmlns:a14="http://schemas.microsoft.com/office/drawing/2010/main" xmlns="" w="9525">
                     <a:solidFill>
                       <a:srgbClr val="000000"/>
                     </a:solidFill>
@@ -44137,7 +44137,7 @@
               </a:ln>
               <a:extLst>
                 <a:ext uri="{91240B29-F687-4f45-9708-019B960494DF}">
-                  <a14:hiddenLine xmlns="" xmlns:a14="http://schemas.microsoft.com/office/drawing/2010/main" w="9525">
+                  <a14:hiddenLine xmlns:a14="http://schemas.microsoft.com/office/drawing/2010/main" xmlns="" w="9525">
                     <a:solidFill>
                       <a:srgbClr val="000000"/>
                     </a:solidFill>
@@ -44252,7 +44252,7 @@
               </a:ln>
               <a:extLst>
                 <a:ext uri="{91240B29-F687-4f45-9708-019B960494DF}">
-                  <a14:hiddenLine xmlns="" xmlns:a14="http://schemas.microsoft.com/office/drawing/2010/main" w="9525">
+                  <a14:hiddenLine xmlns:a14="http://schemas.microsoft.com/office/drawing/2010/main" xmlns="" w="9525">
                     <a:solidFill>
                       <a:srgbClr val="000000"/>
                     </a:solidFill>
@@ -44342,7 +44342,7 @@
               </a:ln>
               <a:extLst>
                 <a:ext uri="{91240B29-F687-4f45-9708-019B960494DF}">
-                  <a14:hiddenLine xmlns="" xmlns:a14="http://schemas.microsoft.com/office/drawing/2010/main" w="9525">
+                  <a14:hiddenLine xmlns:a14="http://schemas.microsoft.com/office/drawing/2010/main" xmlns="" w="9525">
                     <a:solidFill>
                       <a:srgbClr val="000000"/>
                     </a:solidFill>
@@ -44407,7 +44407,7 @@
               </a:ln>
               <a:extLst>
                 <a:ext uri="{91240B29-F687-4f45-9708-019B960494DF}">
-                  <a14:hiddenLine xmlns="" xmlns:a14="http://schemas.microsoft.com/office/drawing/2010/main" w="9525">
+                  <a14:hiddenLine xmlns:a14="http://schemas.microsoft.com/office/drawing/2010/main" xmlns="" w="9525">
                     <a:solidFill>
                       <a:srgbClr val="000000"/>
                     </a:solidFill>
@@ -44497,7 +44497,7 @@
               </a:ln>
               <a:extLst>
                 <a:ext uri="{91240B29-F687-4f45-9708-019B960494DF}">
-                  <a14:hiddenLine xmlns="" xmlns:a14="http://schemas.microsoft.com/office/drawing/2010/main" w="9525">
+                  <a14:hiddenLine xmlns:a14="http://schemas.microsoft.com/office/drawing/2010/main" xmlns="" w="9525">
                     <a:solidFill>
                       <a:srgbClr val="000000"/>
                     </a:solidFill>
@@ -44565,7 +44565,7 @@
               </a:ln>
               <a:extLst>
                 <a:ext uri="{91240B29-F687-4f45-9708-019B960494DF}">
-                  <a14:hiddenLine xmlns="" xmlns:a14="http://schemas.microsoft.com/office/drawing/2010/main" w="9525">
+                  <a14:hiddenLine xmlns:a14="http://schemas.microsoft.com/office/drawing/2010/main" xmlns="" w="9525">
                     <a:solidFill>
                       <a:srgbClr val="000000"/>
                     </a:solidFill>
@@ -44655,7 +44655,7 @@
               </a:ln>
               <a:extLst>
                 <a:ext uri="{91240B29-F687-4f45-9708-019B960494DF}">
-                  <a14:hiddenLine xmlns="" xmlns:a14="http://schemas.microsoft.com/office/drawing/2010/main" w="9525">
+                  <a14:hiddenLine xmlns:a14="http://schemas.microsoft.com/office/drawing/2010/main" xmlns="" w="9525">
                     <a:solidFill>
                       <a:srgbClr val="000000"/>
                     </a:solidFill>
@@ -44723,7 +44723,7 @@
               </a:ln>
               <a:extLst>
                 <a:ext uri="{91240B29-F687-4f45-9708-019B960494DF}">
-                  <a14:hiddenLine xmlns="" xmlns:a14="http://schemas.microsoft.com/office/drawing/2010/main" w="9525">
+                  <a14:hiddenLine xmlns:a14="http://schemas.microsoft.com/office/drawing/2010/main" xmlns="" w="9525">
                     <a:solidFill>
                       <a:srgbClr val="000000"/>
                     </a:solidFill>
@@ -44813,7 +44813,7 @@
               </a:ln>
               <a:extLst>
                 <a:ext uri="{91240B29-F687-4f45-9708-019B960494DF}">
-                  <a14:hiddenLine xmlns="" xmlns:a14="http://schemas.microsoft.com/office/drawing/2010/main" w="9525">
+                  <a14:hiddenLine xmlns:a14="http://schemas.microsoft.com/office/drawing/2010/main" xmlns="" w="9525">
                     <a:solidFill>
                       <a:srgbClr val="000000"/>
                     </a:solidFill>
@@ -44847,7 +44847,7 @@
               </a:ln>
               <a:extLst>
                 <a:ext uri="{91240B29-F687-4f45-9708-019B960494DF}">
-                  <a14:hiddenLine xmlns="" xmlns:a14="http://schemas.microsoft.com/office/drawing/2010/main" w="9525">
+                  <a14:hiddenLine xmlns:a14="http://schemas.microsoft.com/office/drawing/2010/main" xmlns="" w="9525">
                     <a:solidFill>
                       <a:srgbClr val="000000"/>
                     </a:solidFill>
@@ -44987,7 +44987,7 @@
           <a:p>
             <a:fld id="{3C358F7A-A1BB-5840-8499-149F7011A223}" type="datetimeFigureOut">
               <a:rPr lang="en-US" smtClean="0"/>
-              <a:t>4/27/20</a:t>
+              <a:t>4/29/20</a:t>
             </a:fld>
             <a:endParaRPr lang="en-US"/>
           </a:p>
@@ -46382,6 +46382,47 @@
             <a:r>
               <a:rPr lang="en-US" dirty="0"/>
               <a:t>Resulted in an F2 score of .54 on the testing set</a:t>
+            </a:r>
+          </a:p>
+        </p:txBody>
+      </p:sp>
+      <p:sp>
+        <p:nvSpPr>
+          <p:cNvPr id="4" name="TextBox 3">
+            <a:extLst>
+              <a:ext uri="{FF2B5EF4-FFF2-40B4-BE49-F238E27FC236}">
+                <a16:creationId xmlns:a16="http://schemas.microsoft.com/office/drawing/2014/main" id="{60875A56-E92D-9D47-A6E9-0998A16C16F6}"/>
+              </a:ext>
+            </a:extLst>
+          </p:cNvPr>
+          <p:cNvSpPr txBox="1"/>
+          <p:nvPr/>
+        </p:nvSpPr>
+        <p:spPr>
+          <a:xfrm>
+            <a:off x="8534400" y="819807"/>
+            <a:ext cx="2743200" cy="646331"/>
+          </a:xfrm>
+          <a:prstGeom prst="rect">
+            <a:avLst/>
+          </a:prstGeom>
+          <a:noFill/>
+        </p:spPr>
+        <p:txBody>
+          <a:bodyPr wrap="square" rtlCol="0">
+            <a:spAutoFit/>
+          </a:bodyPr>
+          <a:lstStyle/>
+          <a:p>
+            <a:r>
+              <a:rPr lang="en-US" dirty="0"/>
+              <a:t>Leaderboard Team Name:</a:t>
+            </a:r>
+          </a:p>
+          <a:p>
+            <a:r>
+              <a:rPr lang="en-US"/>
+              <a:t>“I guess this’ll work”</a:t>
             </a:r>
           </a:p>
         </p:txBody>

</xml_diff>